<commit_message>
starting with shortener Google API
</commit_message>
<xml_diff>
--- a/URLInvitationProject.pptx
+++ b/URLInvitationProject.pptx
@@ -290,7 +290,7 @@
           <a:p>
             <a:fld id="{4EBC1159-05F0-854B-83A6-9EF556404007}" type="datetimeFigureOut">
               <a:rPr lang="en-US" smtClean="0"/>
-              <a:t>08/10/15</a:t>
+              <a:t>09/10/15</a:t>
             </a:fld>
             <a:endParaRPr lang="en-US"/>
           </a:p>
@@ -460,7 +460,7 @@
           <a:p>
             <a:fld id="{4EBC1159-05F0-854B-83A6-9EF556404007}" type="datetimeFigureOut">
               <a:rPr lang="en-US" smtClean="0"/>
-              <a:t>08/10/15</a:t>
+              <a:t>09/10/15</a:t>
             </a:fld>
             <a:endParaRPr lang="en-US"/>
           </a:p>
@@ -640,7 +640,7 @@
           <a:p>
             <a:fld id="{4EBC1159-05F0-854B-83A6-9EF556404007}" type="datetimeFigureOut">
               <a:rPr lang="en-US" smtClean="0"/>
-              <a:t>08/10/15</a:t>
+              <a:t>09/10/15</a:t>
             </a:fld>
             <a:endParaRPr lang="en-US"/>
           </a:p>
@@ -810,7 +810,7 @@
           <a:p>
             <a:fld id="{4EBC1159-05F0-854B-83A6-9EF556404007}" type="datetimeFigureOut">
               <a:rPr lang="en-US" smtClean="0"/>
-              <a:t>08/10/15</a:t>
+              <a:t>09/10/15</a:t>
             </a:fld>
             <a:endParaRPr lang="en-US"/>
           </a:p>
@@ -1056,7 +1056,7 @@
           <a:p>
             <a:fld id="{4EBC1159-05F0-854B-83A6-9EF556404007}" type="datetimeFigureOut">
               <a:rPr lang="en-US" smtClean="0"/>
-              <a:t>08/10/15</a:t>
+              <a:t>09/10/15</a:t>
             </a:fld>
             <a:endParaRPr lang="en-US"/>
           </a:p>
@@ -1344,7 +1344,7 @@
           <a:p>
             <a:fld id="{4EBC1159-05F0-854B-83A6-9EF556404007}" type="datetimeFigureOut">
               <a:rPr lang="en-US" smtClean="0"/>
-              <a:t>08/10/15</a:t>
+              <a:t>09/10/15</a:t>
             </a:fld>
             <a:endParaRPr lang="en-US"/>
           </a:p>
@@ -1766,7 +1766,7 @@
           <a:p>
             <a:fld id="{4EBC1159-05F0-854B-83A6-9EF556404007}" type="datetimeFigureOut">
               <a:rPr lang="en-US" smtClean="0"/>
-              <a:t>08/10/15</a:t>
+              <a:t>09/10/15</a:t>
             </a:fld>
             <a:endParaRPr lang="en-US"/>
           </a:p>
@@ -1884,7 +1884,7 @@
           <a:p>
             <a:fld id="{4EBC1159-05F0-854B-83A6-9EF556404007}" type="datetimeFigureOut">
               <a:rPr lang="en-US" smtClean="0"/>
-              <a:t>08/10/15</a:t>
+              <a:t>09/10/15</a:t>
             </a:fld>
             <a:endParaRPr lang="en-US"/>
           </a:p>
@@ -1979,7 +1979,7 @@
           <a:p>
             <a:fld id="{4EBC1159-05F0-854B-83A6-9EF556404007}" type="datetimeFigureOut">
               <a:rPr lang="en-US" smtClean="0"/>
-              <a:t>08/10/15</a:t>
+              <a:t>09/10/15</a:t>
             </a:fld>
             <a:endParaRPr lang="en-US"/>
           </a:p>
@@ -2256,7 +2256,7 @@
           <a:p>
             <a:fld id="{4EBC1159-05F0-854B-83A6-9EF556404007}" type="datetimeFigureOut">
               <a:rPr lang="en-US" smtClean="0"/>
-              <a:t>08/10/15</a:t>
+              <a:t>09/10/15</a:t>
             </a:fld>
             <a:endParaRPr lang="en-US"/>
           </a:p>
@@ -2509,7 +2509,7 @@
           <a:p>
             <a:fld id="{4EBC1159-05F0-854B-83A6-9EF556404007}" type="datetimeFigureOut">
               <a:rPr lang="en-US" smtClean="0"/>
-              <a:t>08/10/15</a:t>
+              <a:t>09/10/15</a:t>
             </a:fld>
             <a:endParaRPr lang="en-US"/>
           </a:p>
@@ -2722,7 +2722,7 @@
           <a:p>
             <a:fld id="{4EBC1159-05F0-854B-83A6-9EF556404007}" type="datetimeFigureOut">
               <a:rPr lang="en-US" smtClean="0"/>
-              <a:t>08/10/15</a:t>
+              <a:t>09/10/15</a:t>
             </a:fld>
             <a:endParaRPr lang="en-US"/>
           </a:p>
@@ -3439,7 +3439,7 @@
           <p:nvPr>
             <p:extLst>
               <p:ext uri="{D42A27DB-BD31-4B8C-83A1-F6EECF244321}">
-                <p14:modId xmlns:p14="http://schemas.microsoft.com/office/powerpoint/2010/main" val="507912315"/>
+                <p14:modId xmlns:p14="http://schemas.microsoft.com/office/powerpoint/2010/main" val="2925098715"/>
               </p:ext>
             </p:extLst>
           </p:nvPr>
@@ -3866,7 +3866,7 @@
                     <a:p>
                       <a:r>
                         <a:rPr lang="en-US" dirty="0" smtClean="0"/>
-                        <a:t>05.10.2015</a:t>
+                        <a:t>09.10.2016</a:t>
                       </a:r>
                       <a:endParaRPr lang="en-US" dirty="0"/>
                     </a:p>
@@ -3972,7 +3972,15 @@
               </a:r>
               <a:r>
                 <a:rPr lang="en-US" dirty="0" smtClean="0"/>
-                <a:t>: 05.10.2015 }</a:t>
+                <a:t>: </a:t>
+              </a:r>
+              <a:r>
+                <a:rPr lang="en-US" dirty="0" smtClean="0"/>
+                <a:t>09.10.2016 </a:t>
+              </a:r>
+              <a:r>
+                <a:rPr lang="en-US" dirty="0" smtClean="0"/>
+                <a:t>}</a:t>
               </a:r>
               <a:endParaRPr lang="en-US" dirty="0"/>
             </a:p>
@@ -4507,7 +4515,15 @@
               </a:r>
               <a:r>
                 <a:rPr lang="en-US" dirty="0" smtClean="0"/>
-                <a:t>: 05.10.2015, hash:        }</a:t>
+                <a:t>: </a:t>
+              </a:r>
+              <a:r>
+                <a:rPr lang="en-US" dirty="0" smtClean="0"/>
+                <a:t>09.10.2016, </a:t>
+              </a:r>
+              <a:r>
+                <a:rPr lang="en-US" dirty="0" smtClean="0"/>
+                <a:t>hash:        }</a:t>
               </a:r>
               <a:endParaRPr lang="en-US" dirty="0"/>
             </a:p>
@@ -5764,8 +5780,20 @@
                 <a:t>val</a:t>
               </a:r>
               <a:r>
+                <a:rPr lang="en-US" smtClean="0"/>
+                <a:t>: </a:t>
+              </a:r>
+              <a:r>
+                <a:rPr lang="en-US" smtClean="0"/>
+                <a:t>09.10.2016</a:t>
+              </a:r>
+              <a:r>
                 <a:rPr lang="en-US" dirty="0" smtClean="0"/>
-                <a:t>: 05.10.2015, hash: ……. }</a:t>
+                <a:t>, </a:t>
+              </a:r>
+              <a:r>
+                <a:rPr lang="en-US" dirty="0" smtClean="0"/>
+                <a:t>hash: ……. }</a:t>
               </a:r>
               <a:endParaRPr lang="en-US" dirty="0"/>
             </a:p>

</xml_diff>